<commit_message>
RNN Sentiment with IMDb review.
</commit_message>
<xml_diff>
--- a/101_RNNSentiment.pptx
+++ b/101_RNNSentiment.pptx
@@ -5,7 +5,7 @@
     <p:sldMasterId id="2147483648" r:id="rId1"/>
   </p:sldMasterIdLst>
   <p:notesMasterIdLst>
-    <p:notesMasterId r:id="rId30"/>
+    <p:notesMasterId r:id="rId31"/>
   </p:notesMasterIdLst>
   <p:sldIdLst>
     <p:sldId id="256" r:id="rId2"/>
@@ -33,9 +33,10 @@
     <p:sldId id="341" r:id="rId24"/>
     <p:sldId id="342" r:id="rId25"/>
     <p:sldId id="343" r:id="rId26"/>
-    <p:sldId id="344" r:id="rId27"/>
-    <p:sldId id="345" r:id="rId28"/>
-    <p:sldId id="259" r:id="rId29"/>
+    <p:sldId id="346" r:id="rId27"/>
+    <p:sldId id="344" r:id="rId28"/>
+    <p:sldId id="345" r:id="rId29"/>
+    <p:sldId id="259" r:id="rId30"/>
   </p:sldIdLst>
   <p:sldSz cx="9144000" cy="6858000" type="screen4x3"/>
   <p:notesSz cx="6858000" cy="9144000"/>
@@ -11576,8 +11577,8 @@
         </p:nvSpPr>
         <p:spPr>
           <a:xfrm>
-            <a:off x="4510088" y="3720069"/>
-            <a:ext cx="3592016" cy="2077441"/>
+            <a:off x="4355976" y="3720069"/>
+            <a:ext cx="3746128" cy="2598504"/>
           </a:xfrm>
           <a:prstGeom prst="rect">
             <a:avLst/>
@@ -11897,155 +11898,6 @@
         </p:nvSpPr>
         <p:spPr>
           <a:xfrm>
-            <a:off x="0" y="2130425"/>
-            <a:ext cx="9144000" cy="1470025"/>
-          </a:xfrm>
-          <a:solidFill>
-            <a:srgbClr val="00B0F0"/>
-          </a:solidFill>
-        </p:spPr>
-        <p:txBody>
-          <a:bodyPr>
-            <a:normAutofit/>
-          </a:bodyPr>
-          <a:lstStyle/>
-          <a:p>
-            <a:r>
-              <a:rPr lang="en-US" altLang="zh-TW" sz="4800" b="1" dirty="0">
-                <a:solidFill>
-                  <a:srgbClr val="FFFF00"/>
-                </a:solidFill>
-              </a:rPr>
-              <a:t>101.9 Summary</a:t>
-            </a:r>
-            <a:endParaRPr lang="zh-TW" altLang="en-US" sz="4800" b="1" dirty="0">
-              <a:solidFill>
-                <a:srgbClr val="FFFF00"/>
-              </a:solidFill>
-            </a:endParaRPr>
-          </a:p>
-        </p:txBody>
-      </p:sp>
-      <p:sp>
-        <p:nvSpPr>
-          <p:cNvPr id="5" name="日期版面配置區 4"/>
-          <p:cNvSpPr>
-            <a:spLocks noGrp="1"/>
-          </p:cNvSpPr>
-          <p:nvPr>
-            <p:ph type="dt" sz="half" idx="10"/>
-          </p:nvPr>
-        </p:nvSpPr>
-        <p:spPr/>
-        <p:txBody>
-          <a:bodyPr/>
-          <a:lstStyle/>
-          <a:p>
-            <a:fld id="{C389EDC9-19E3-47AC-9C57-C6A24DEA81AD}" type="datetime1">
-              <a:rPr lang="zh-TW" altLang="en-US" smtClean="0"/>
-              <a:pPr/>
-              <a:t>2020/9/21</a:t>
-            </a:fld>
-            <a:endParaRPr lang="zh-TW" altLang="en-US"/>
-          </a:p>
-        </p:txBody>
-      </p:sp>
-      <p:sp>
-        <p:nvSpPr>
-          <p:cNvPr id="6" name="投影片編號版面配置區 5"/>
-          <p:cNvSpPr>
-            <a:spLocks noGrp="1"/>
-          </p:cNvSpPr>
-          <p:nvPr>
-            <p:ph type="sldNum" sz="quarter" idx="12"/>
-          </p:nvPr>
-        </p:nvSpPr>
-        <p:spPr/>
-        <p:txBody>
-          <a:bodyPr/>
-          <a:lstStyle/>
-          <a:p>
-            <a:fld id="{E4D7E63D-91F2-4366-A2C4-1B00C9E2590E}" type="slidenum">
-              <a:rPr lang="zh-TW" altLang="en-US" smtClean="0"/>
-              <a:pPr/>
-              <a:t>26</a:t>
-            </a:fld>
-            <a:endParaRPr lang="zh-TW" altLang="en-US"/>
-          </a:p>
-        </p:txBody>
-      </p:sp>
-      <p:pic>
-        <p:nvPicPr>
-          <p:cNvPr id="7" name="Picture 6">
-            <a:extLst>
-              <a:ext uri="{FF2B5EF4-FFF2-40B4-BE49-F238E27FC236}">
-                <a16:creationId xmlns:a16="http://schemas.microsoft.com/office/drawing/2014/main" id="{1BE488C5-DA27-405E-9F7E-A4EF5DF95762}"/>
-              </a:ext>
-            </a:extLst>
-          </p:cNvPr>
-          <p:cNvPicPr>
-            <a:picLocks noChangeAspect="1"/>
-          </p:cNvPicPr>
-          <p:nvPr/>
-        </p:nvPicPr>
-        <p:blipFill>
-          <a:blip r:embed="rId2"/>
-          <a:stretch>
-            <a:fillRect/>
-          </a:stretch>
-        </p:blipFill>
-        <p:spPr>
-          <a:xfrm>
-            <a:off x="3923928" y="3695964"/>
-            <a:ext cx="1004960" cy="885164"/>
-          </a:xfrm>
-          <a:prstGeom prst="rect">
-            <a:avLst/>
-          </a:prstGeom>
-        </p:spPr>
-      </p:pic>
-    </p:spTree>
-    <p:extLst>
-      <p:ext uri="{BB962C8B-B14F-4D97-AF65-F5344CB8AC3E}">
-        <p14:creationId xmlns:p14="http://schemas.microsoft.com/office/powerpoint/2010/main" val="2038381623"/>
-      </p:ext>
-    </p:extLst>
-  </p:cSld>
-  <p:clrMapOvr>
-    <a:masterClrMapping/>
-  </p:clrMapOvr>
-</p:sld>
-</file>
-
-<file path=ppt/slides/slide27.xml><?xml version="1.0" encoding="utf-8"?>
-<p:sld xmlns:a="http://schemas.openxmlformats.org/drawingml/2006/main" xmlns:r="http://schemas.openxmlformats.org/officeDocument/2006/relationships" xmlns:p="http://schemas.openxmlformats.org/presentationml/2006/main">
-  <p:cSld>
-    <p:spTree>
-      <p:nvGrpSpPr>
-        <p:cNvPr id="1" name=""/>
-        <p:cNvGrpSpPr/>
-        <p:nvPr/>
-      </p:nvGrpSpPr>
-      <p:grpSpPr>
-        <a:xfrm>
-          <a:off x="0" y="0"/>
-          <a:ext cx="0" cy="0"/>
-          <a:chOff x="0" y="0"/>
-          <a:chExt cx="0" cy="0"/>
-        </a:xfrm>
-      </p:grpSpPr>
-      <p:sp>
-        <p:nvSpPr>
-          <p:cNvPr id="2" name="標題 1"/>
-          <p:cNvSpPr>
-            <a:spLocks noGrp="1"/>
-          </p:cNvSpPr>
-          <p:nvPr>
-            <p:ph type="ctrTitle"/>
-          </p:nvPr>
-        </p:nvSpPr>
-        <p:spPr>
-          <a:xfrm>
             <a:off x="0" y="0"/>
             <a:ext cx="9144000" cy="764704"/>
           </a:xfrm>
@@ -12089,7 +11941,7 @@
                   <a:srgbClr val="FFFF00"/>
                 </a:solidFill>
               </a:rPr>
-              <a:t>101.9 Summary</a:t>
+              <a:t>101.8 Train/Score RNN Model</a:t>
             </a:r>
             <a:endParaRPr lang="zh-TW" altLang="en-US" b="1" dirty="0">
               <a:solidFill>
@@ -12112,7 +11964,7 @@
         <p:spPr>
           <a:xfrm>
             <a:off x="426368" y="1357970"/>
-            <a:ext cx="8291263" cy="3511190"/>
+            <a:ext cx="8291263" cy="432116"/>
           </a:xfrm>
           <a:ln>
             <a:solidFill>
@@ -12144,215 +11996,13 @@
                 </a:solidFill>
                 <a:effectLst/>
               </a:rPr>
-              <a:t>Summary</a:t>
-            </a:r>
-            <a:endParaRPr kumimoji="0" lang="en-US" altLang="en-US" sz="1800" b="1" u="none" strike="noStrike" cap="none" normalizeH="0" baseline="0" dirty="0">
-              <a:ln>
-                <a:noFill/>
-              </a:ln>
+              <a:t>Train/Score RNN Model</a:t>
+            </a:r>
+            <a:endParaRPr lang="en-US" altLang="en-US" sz="1800" b="1" dirty="0">
               <a:solidFill>
                 <a:schemeClr val="tx1"/>
               </a:solidFill>
             </a:endParaRPr>
-          </a:p>
-          <a:p>
-            <a:pPr marL="342900" indent="-342900" algn="l">
-              <a:buClr>
-                <a:srgbClr val="0070C0"/>
-              </a:buClr>
-              <a:buSzPct val="80000"/>
-              <a:buFont typeface="Wingdings" pitchFamily="2" charset="2"/>
-              <a:buChar char="u"/>
-            </a:pPr>
-            <a:r>
-              <a:rPr lang="en-US" sz="1800" b="1" i="0" dirty="0">
-                <a:solidFill>
-                  <a:schemeClr val="tx1"/>
-                </a:solidFill>
-                <a:effectLst/>
-              </a:rPr>
-              <a:t>Score is only 80%? </a:t>
-            </a:r>
-          </a:p>
-          <a:p>
-            <a:pPr marL="342900" indent="-342900" algn="l">
-              <a:buClr>
-                <a:srgbClr val="0070C0"/>
-              </a:buClr>
-              <a:buSzPct val="80000"/>
-              <a:buFont typeface="Wingdings" pitchFamily="2" charset="2"/>
-              <a:buChar char="u"/>
-            </a:pPr>
-            <a:r>
-              <a:rPr lang="en-US" sz="1800" b="1" i="0" dirty="0">
-                <a:solidFill>
-                  <a:schemeClr val="tx1"/>
-                </a:solidFill>
-                <a:effectLst/>
-              </a:rPr>
-              <a:t>Not too bad, we limited to the first 80 words of each review.</a:t>
-            </a:r>
-          </a:p>
-          <a:p>
-            <a:pPr marL="342900" indent="-342900" algn="l">
-              <a:buClr>
-                <a:srgbClr val="0070C0"/>
-              </a:buClr>
-              <a:buSzPct val="80000"/>
-              <a:buFont typeface="Wingdings" pitchFamily="2" charset="2"/>
-              <a:buChar char="u"/>
-            </a:pPr>
-            <a:r>
-              <a:rPr lang="en-US" sz="1800" b="1" i="0" dirty="0">
-                <a:solidFill>
-                  <a:schemeClr val="tx1"/>
-                </a:solidFill>
-                <a:effectLst/>
-              </a:rPr>
-              <a:t>Note:</a:t>
-            </a:r>
-          </a:p>
-          <a:p>
-            <a:pPr marL="342900" indent="-342900" algn="l">
-              <a:buClr>
-                <a:srgbClr val="0070C0"/>
-              </a:buClr>
-              <a:buSzPct val="80000"/>
-              <a:buFont typeface="Wingdings" pitchFamily="2" charset="2"/>
-              <a:buChar char="u"/>
-            </a:pPr>
-            <a:r>
-              <a:rPr lang="en-US" sz="1800" b="1" dirty="0">
-                <a:solidFill>
-                  <a:schemeClr val="tx1"/>
-                </a:solidFill>
-              </a:rPr>
-              <a:t>T</a:t>
-            </a:r>
-            <a:r>
-              <a:rPr lang="en-US" sz="1800" b="1" i="0" dirty="0">
-                <a:solidFill>
-                  <a:schemeClr val="tx1"/>
-                </a:solidFill>
-                <a:effectLst/>
-              </a:rPr>
-              <a:t>he validation accuracy while we were training never really improved after the first epoch. </a:t>
-            </a:r>
-            <a:r>
-              <a:rPr lang="en-US" sz="1800" b="1" dirty="0">
-                <a:solidFill>
-                  <a:schemeClr val="tx1"/>
-                </a:solidFill>
-              </a:rPr>
-              <a:t>The model</a:t>
-            </a:r>
-            <a:r>
-              <a:rPr lang="en-US" sz="1800" b="1" i="0" dirty="0">
-                <a:solidFill>
-                  <a:schemeClr val="tx1"/>
-                </a:solidFill>
-                <a:effectLst/>
-              </a:rPr>
-              <a:t> is overfitting. </a:t>
-            </a:r>
-            <a:r>
-              <a:rPr lang="en-US" sz="1800" b="1" dirty="0">
-                <a:solidFill>
-                  <a:schemeClr val="tx1"/>
-                </a:solidFill>
-              </a:rPr>
-              <a:t>We can do</a:t>
-            </a:r>
-            <a:r>
-              <a:rPr lang="en-US" sz="1800" b="1" i="0" dirty="0">
-                <a:solidFill>
-                  <a:schemeClr val="tx1"/>
-                </a:solidFill>
-                <a:effectLst/>
-              </a:rPr>
-              <a:t> early stop after first epoch.</a:t>
-            </a:r>
-          </a:p>
-          <a:p>
-            <a:pPr marL="342900" indent="-342900" algn="l">
-              <a:buClr>
-                <a:srgbClr val="0070C0"/>
-              </a:buClr>
-              <a:buSzPct val="80000"/>
-              <a:buFont typeface="Wingdings" pitchFamily="2" charset="2"/>
-              <a:buChar char="u"/>
-            </a:pPr>
-            <a:r>
-              <a:rPr lang="en-US" sz="1800" b="1" dirty="0">
-                <a:solidFill>
-                  <a:schemeClr val="tx1"/>
-                </a:solidFill>
-              </a:rPr>
-              <a:t>RNN</a:t>
-            </a:r>
-            <a:r>
-              <a:rPr lang="en-US" sz="1800" b="1" i="0" dirty="0">
-                <a:solidFill>
-                  <a:schemeClr val="tx1"/>
-                </a:solidFill>
-                <a:effectLst/>
-              </a:rPr>
-              <a:t> that can "read" reviews and deduce whether the author liked the movie or not based on that text. </a:t>
-            </a:r>
-          </a:p>
-          <a:p>
-            <a:pPr marL="342900" indent="-342900" algn="l">
-              <a:buClr>
-                <a:srgbClr val="0070C0"/>
-              </a:buClr>
-              <a:buSzPct val="80000"/>
-              <a:buFont typeface="Wingdings" pitchFamily="2" charset="2"/>
-              <a:buChar char="u"/>
-            </a:pPr>
-            <a:r>
-              <a:rPr lang="en-US" sz="1800" b="1" dirty="0">
-                <a:solidFill>
-                  <a:schemeClr val="tx1"/>
-                </a:solidFill>
-              </a:rPr>
-              <a:t>RNN</a:t>
-            </a:r>
-            <a:r>
-              <a:rPr lang="en-US" sz="1800" b="1" i="0" dirty="0">
-                <a:solidFill>
-                  <a:schemeClr val="tx1"/>
-                </a:solidFill>
-                <a:effectLst/>
-              </a:rPr>
-              <a:t> takes the context of each word and its position in the review into account - and setting up the model itself was just a few lines of code.</a:t>
-            </a:r>
-          </a:p>
-          <a:p>
-            <a:pPr marL="342900" indent="-342900" algn="l">
-              <a:buClr>
-                <a:srgbClr val="0070C0"/>
-              </a:buClr>
-              <a:buSzPct val="80000"/>
-              <a:buFont typeface="Wingdings" pitchFamily="2" charset="2"/>
-              <a:buChar char="u"/>
-            </a:pPr>
-            <a:r>
-              <a:rPr lang="en-US" sz="1800" b="1" dirty="0">
-                <a:solidFill>
-                  <a:schemeClr val="tx1"/>
-                </a:solidFill>
-              </a:rPr>
-              <a:t>RNN can be implemented easily</a:t>
-            </a:r>
-            <a:r>
-              <a:rPr lang="en-US" sz="1800" b="1" i="0" dirty="0">
-                <a:solidFill>
-                  <a:schemeClr val="tx1"/>
-                </a:solidFill>
-                <a:effectLst/>
-              </a:rPr>
-              <a:t> with Keras.</a:t>
-            </a:r>
           </a:p>
         </p:txBody>
       </p:sp>
@@ -12478,7 +12128,7 @@
             <a:fld id="{E4D7E63D-91F2-4366-A2C4-1B00C9E2590E}" type="slidenum">
               <a:rPr lang="zh-TW" altLang="en-US" smtClean="0"/>
               <a:pPr/>
-              <a:t>27</a:t>
+              <a:t>26</a:t>
             </a:fld>
             <a:endParaRPr lang="zh-TW" altLang="en-US"/>
           </a:p>
@@ -12678,10 +12328,414 @@
           </a:p>
         </p:txBody>
       </p:sp>
+      <p:sp>
+        <p:nvSpPr>
+          <p:cNvPr id="13" name="副標題 2">
+            <a:extLst>
+              <a:ext uri="{FF2B5EF4-FFF2-40B4-BE49-F238E27FC236}">
+                <a16:creationId xmlns:a16="http://schemas.microsoft.com/office/drawing/2014/main" id="{331D45A4-E3DF-40F3-AD2F-43B3CC307EA7}"/>
+              </a:ext>
+            </a:extLst>
+          </p:cNvPr>
+          <p:cNvSpPr txBox="1">
+            <a:spLocks/>
+          </p:cNvSpPr>
+          <p:nvPr/>
+        </p:nvSpPr>
+        <p:spPr>
+          <a:xfrm>
+            <a:off x="426368" y="1908135"/>
+            <a:ext cx="2345432" cy="1232833"/>
+          </a:xfrm>
+          <a:prstGeom prst="rect">
+            <a:avLst/>
+          </a:prstGeom>
+          <a:ln>
+            <a:solidFill>
+              <a:srgbClr val="C00000"/>
+            </a:solidFill>
+          </a:ln>
+        </p:spPr>
+        <p:txBody>
+          <a:bodyPr vert="horz" lIns="91440" tIns="45720" rIns="91440" bIns="45720" rtlCol="0">
+            <a:noAutofit/>
+          </a:bodyPr>
+          <a:lstStyle>
+            <a:lvl1pPr marL="0" indent="0" algn="ctr" defTabSz="914400" rtl="0" eaLnBrk="1" latinLnBrk="0" hangingPunct="1">
+              <a:spcBef>
+                <a:spcPct val="20000"/>
+              </a:spcBef>
+              <a:buFont typeface="Arial" pitchFamily="34" charset="0"/>
+              <a:buNone/>
+              <a:defRPr sz="3200" kern="1200">
+                <a:solidFill>
+                  <a:schemeClr val="tx1">
+                    <a:tint val="75000"/>
+                  </a:schemeClr>
+                </a:solidFill>
+                <a:latin typeface="+mn-lt"/>
+                <a:ea typeface="+mn-ea"/>
+                <a:cs typeface="+mn-cs"/>
+              </a:defRPr>
+            </a:lvl1pPr>
+            <a:lvl2pPr marL="457200" indent="0" algn="ctr" defTabSz="914400" rtl="0" eaLnBrk="1" latinLnBrk="0" hangingPunct="1">
+              <a:spcBef>
+                <a:spcPct val="20000"/>
+              </a:spcBef>
+              <a:buFont typeface="Arial" pitchFamily="34" charset="0"/>
+              <a:buNone/>
+              <a:defRPr sz="2800" kern="1200">
+                <a:solidFill>
+                  <a:schemeClr val="tx1">
+                    <a:tint val="75000"/>
+                  </a:schemeClr>
+                </a:solidFill>
+                <a:latin typeface="+mn-lt"/>
+                <a:ea typeface="+mn-ea"/>
+                <a:cs typeface="+mn-cs"/>
+              </a:defRPr>
+            </a:lvl2pPr>
+            <a:lvl3pPr marL="914400" indent="0" algn="ctr" defTabSz="914400" rtl="0" eaLnBrk="1" latinLnBrk="0" hangingPunct="1">
+              <a:spcBef>
+                <a:spcPct val="20000"/>
+              </a:spcBef>
+              <a:buFont typeface="Arial" pitchFamily="34" charset="0"/>
+              <a:buNone/>
+              <a:defRPr sz="2400" kern="1200">
+                <a:solidFill>
+                  <a:schemeClr val="tx1">
+                    <a:tint val="75000"/>
+                  </a:schemeClr>
+                </a:solidFill>
+                <a:latin typeface="+mn-lt"/>
+                <a:ea typeface="+mn-ea"/>
+                <a:cs typeface="+mn-cs"/>
+              </a:defRPr>
+            </a:lvl3pPr>
+            <a:lvl4pPr marL="1371600" indent="0" algn="ctr" defTabSz="914400" rtl="0" eaLnBrk="1" latinLnBrk="0" hangingPunct="1">
+              <a:spcBef>
+                <a:spcPct val="20000"/>
+              </a:spcBef>
+              <a:buFont typeface="Arial" pitchFamily="34" charset="0"/>
+              <a:buNone/>
+              <a:defRPr sz="2000" kern="1200">
+                <a:solidFill>
+                  <a:schemeClr val="tx1">
+                    <a:tint val="75000"/>
+                  </a:schemeClr>
+                </a:solidFill>
+                <a:latin typeface="+mn-lt"/>
+                <a:ea typeface="+mn-ea"/>
+                <a:cs typeface="+mn-cs"/>
+              </a:defRPr>
+            </a:lvl4pPr>
+            <a:lvl5pPr marL="1828800" indent="0" algn="ctr" defTabSz="914400" rtl="0" eaLnBrk="1" latinLnBrk="0" hangingPunct="1">
+              <a:spcBef>
+                <a:spcPct val="20000"/>
+              </a:spcBef>
+              <a:buFont typeface="Arial" pitchFamily="34" charset="0"/>
+              <a:buNone/>
+              <a:defRPr sz="2000" kern="1200">
+                <a:solidFill>
+                  <a:schemeClr val="tx1">
+                    <a:tint val="75000"/>
+                  </a:schemeClr>
+                </a:solidFill>
+                <a:latin typeface="+mn-lt"/>
+                <a:ea typeface="+mn-ea"/>
+                <a:cs typeface="+mn-cs"/>
+              </a:defRPr>
+            </a:lvl5pPr>
+            <a:lvl6pPr marL="2286000" indent="0" algn="ctr" defTabSz="914400" rtl="0" eaLnBrk="1" latinLnBrk="0" hangingPunct="1">
+              <a:spcBef>
+                <a:spcPct val="20000"/>
+              </a:spcBef>
+              <a:buFont typeface="Arial" pitchFamily="34" charset="0"/>
+              <a:buNone/>
+              <a:defRPr sz="2000" kern="1200">
+                <a:solidFill>
+                  <a:schemeClr val="tx1">
+                    <a:tint val="75000"/>
+                  </a:schemeClr>
+                </a:solidFill>
+                <a:latin typeface="+mn-lt"/>
+                <a:ea typeface="+mn-ea"/>
+                <a:cs typeface="+mn-cs"/>
+              </a:defRPr>
+            </a:lvl6pPr>
+            <a:lvl7pPr marL="2743200" indent="0" algn="ctr" defTabSz="914400" rtl="0" eaLnBrk="1" latinLnBrk="0" hangingPunct="1">
+              <a:spcBef>
+                <a:spcPct val="20000"/>
+              </a:spcBef>
+              <a:buFont typeface="Arial" pitchFamily="34" charset="0"/>
+              <a:buNone/>
+              <a:defRPr sz="2000" kern="1200">
+                <a:solidFill>
+                  <a:schemeClr val="tx1">
+                    <a:tint val="75000"/>
+                  </a:schemeClr>
+                </a:solidFill>
+                <a:latin typeface="+mn-lt"/>
+                <a:ea typeface="+mn-ea"/>
+                <a:cs typeface="+mn-cs"/>
+              </a:defRPr>
+            </a:lvl7pPr>
+            <a:lvl8pPr marL="3200400" indent="0" algn="ctr" defTabSz="914400" rtl="0" eaLnBrk="1" latinLnBrk="0" hangingPunct="1">
+              <a:spcBef>
+                <a:spcPct val="20000"/>
+              </a:spcBef>
+              <a:buFont typeface="Arial" pitchFamily="34" charset="0"/>
+              <a:buNone/>
+              <a:defRPr sz="2000" kern="1200">
+                <a:solidFill>
+                  <a:schemeClr val="tx1">
+                    <a:tint val="75000"/>
+                  </a:schemeClr>
+                </a:solidFill>
+                <a:latin typeface="+mn-lt"/>
+                <a:ea typeface="+mn-ea"/>
+                <a:cs typeface="+mn-cs"/>
+              </a:defRPr>
+            </a:lvl8pPr>
+            <a:lvl9pPr marL="3657600" indent="0" algn="ctr" defTabSz="914400" rtl="0" eaLnBrk="1" latinLnBrk="0" hangingPunct="1">
+              <a:spcBef>
+                <a:spcPct val="20000"/>
+              </a:spcBef>
+              <a:buFont typeface="Arial" pitchFamily="34" charset="0"/>
+              <a:buNone/>
+              <a:defRPr sz="2000" kern="1200">
+                <a:solidFill>
+                  <a:schemeClr val="tx1">
+                    <a:tint val="75000"/>
+                  </a:schemeClr>
+                </a:solidFill>
+                <a:latin typeface="+mn-lt"/>
+                <a:ea typeface="+mn-ea"/>
+                <a:cs typeface="+mn-cs"/>
+              </a:defRPr>
+            </a:lvl9pPr>
+          </a:lstStyle>
+          <a:p>
+            <a:pPr marL="342900" indent="-342900" algn="l">
+              <a:buClr>
+                <a:srgbClr val="0070C0"/>
+              </a:buClr>
+              <a:buSzPct val="80000"/>
+              <a:buFont typeface="Wingdings" pitchFamily="2" charset="2"/>
+              <a:buChar char="u"/>
+            </a:pPr>
+            <a:r>
+              <a:rPr lang="en-US" sz="1800" b="1" dirty="0">
+                <a:solidFill>
+                  <a:schemeClr val="tx1"/>
+                </a:solidFill>
+              </a:rPr>
+              <a:t>1. Train RNN Model</a:t>
+            </a:r>
+          </a:p>
+          <a:p>
+            <a:pPr marL="342900" indent="-342900" algn="l">
+              <a:buClr>
+                <a:srgbClr val="0070C0"/>
+              </a:buClr>
+              <a:buSzPct val="80000"/>
+              <a:buFont typeface="Wingdings" pitchFamily="2" charset="2"/>
+              <a:buChar char="u"/>
+            </a:pPr>
+            <a:r>
+              <a:rPr lang="en-US" sz="1800" b="1" dirty="0">
+                <a:solidFill>
+                  <a:schemeClr val="tx1"/>
+                </a:solidFill>
+              </a:rPr>
+              <a:t>2. Score RNN Model</a:t>
+            </a:r>
+          </a:p>
+        </p:txBody>
+      </p:sp>
+      <p:pic>
+        <p:nvPicPr>
+          <p:cNvPr id="7" name="Picture 6">
+            <a:extLst>
+              <a:ext uri="{FF2B5EF4-FFF2-40B4-BE49-F238E27FC236}">
+                <a16:creationId xmlns:a16="http://schemas.microsoft.com/office/drawing/2014/main" id="{4596C35E-65D6-4B21-AFC3-3EE3FE6401B6}"/>
+              </a:ext>
+            </a:extLst>
+          </p:cNvPr>
+          <p:cNvPicPr>
+            <a:picLocks noChangeAspect="1"/>
+          </p:cNvPicPr>
+          <p:nvPr/>
+        </p:nvPicPr>
+        <p:blipFill>
+          <a:blip r:embed="rId4"/>
+          <a:stretch>
+            <a:fillRect/>
+          </a:stretch>
+        </p:blipFill>
+        <p:spPr>
+          <a:xfrm>
+            <a:off x="2771800" y="1889448"/>
+            <a:ext cx="6063233" cy="4356720"/>
+          </a:xfrm>
+          <a:prstGeom prst="rect">
+            <a:avLst/>
+          </a:prstGeom>
+        </p:spPr>
+      </p:pic>
     </p:spTree>
     <p:extLst>
       <p:ext uri="{BB962C8B-B14F-4D97-AF65-F5344CB8AC3E}">
-        <p14:creationId xmlns:p14="http://schemas.microsoft.com/office/powerpoint/2010/main" val="2090967265"/>
+        <p14:creationId xmlns:p14="http://schemas.microsoft.com/office/powerpoint/2010/main" val="2466276508"/>
+      </p:ext>
+    </p:extLst>
+  </p:cSld>
+  <p:clrMapOvr>
+    <a:masterClrMapping/>
+  </p:clrMapOvr>
+</p:sld>
+</file>
+
+<file path=ppt/slides/slide27.xml><?xml version="1.0" encoding="utf-8"?>
+<p:sld xmlns:a="http://schemas.openxmlformats.org/drawingml/2006/main" xmlns:r="http://schemas.openxmlformats.org/officeDocument/2006/relationships" xmlns:p="http://schemas.openxmlformats.org/presentationml/2006/main">
+  <p:cSld>
+    <p:spTree>
+      <p:nvGrpSpPr>
+        <p:cNvPr id="1" name=""/>
+        <p:cNvGrpSpPr/>
+        <p:nvPr/>
+      </p:nvGrpSpPr>
+      <p:grpSpPr>
+        <a:xfrm>
+          <a:off x="0" y="0"/>
+          <a:ext cx="0" cy="0"/>
+          <a:chOff x="0" y="0"/>
+          <a:chExt cx="0" cy="0"/>
+        </a:xfrm>
+      </p:grpSpPr>
+      <p:sp>
+        <p:nvSpPr>
+          <p:cNvPr id="2" name="標題 1"/>
+          <p:cNvSpPr>
+            <a:spLocks noGrp="1"/>
+          </p:cNvSpPr>
+          <p:nvPr>
+            <p:ph type="ctrTitle"/>
+          </p:nvPr>
+        </p:nvSpPr>
+        <p:spPr>
+          <a:xfrm>
+            <a:off x="0" y="2130425"/>
+            <a:ext cx="9144000" cy="1470025"/>
+          </a:xfrm>
+          <a:solidFill>
+            <a:srgbClr val="00B0F0"/>
+          </a:solidFill>
+        </p:spPr>
+        <p:txBody>
+          <a:bodyPr>
+            <a:normAutofit/>
+          </a:bodyPr>
+          <a:lstStyle/>
+          <a:p>
+            <a:r>
+              <a:rPr lang="en-US" altLang="zh-TW" sz="4800" b="1" dirty="0">
+                <a:solidFill>
+                  <a:srgbClr val="FFFF00"/>
+                </a:solidFill>
+              </a:rPr>
+              <a:t>101.9 Summary</a:t>
+            </a:r>
+            <a:endParaRPr lang="zh-TW" altLang="en-US" sz="4800" b="1" dirty="0">
+              <a:solidFill>
+                <a:srgbClr val="FFFF00"/>
+              </a:solidFill>
+            </a:endParaRPr>
+          </a:p>
+        </p:txBody>
+      </p:sp>
+      <p:sp>
+        <p:nvSpPr>
+          <p:cNvPr id="5" name="日期版面配置區 4"/>
+          <p:cNvSpPr>
+            <a:spLocks noGrp="1"/>
+          </p:cNvSpPr>
+          <p:nvPr>
+            <p:ph type="dt" sz="half" idx="10"/>
+          </p:nvPr>
+        </p:nvSpPr>
+        <p:spPr/>
+        <p:txBody>
+          <a:bodyPr/>
+          <a:lstStyle/>
+          <a:p>
+            <a:fld id="{C389EDC9-19E3-47AC-9C57-C6A24DEA81AD}" type="datetime1">
+              <a:rPr lang="zh-TW" altLang="en-US" smtClean="0"/>
+              <a:pPr/>
+              <a:t>2020/9/21</a:t>
+            </a:fld>
+            <a:endParaRPr lang="zh-TW" altLang="en-US"/>
+          </a:p>
+        </p:txBody>
+      </p:sp>
+      <p:sp>
+        <p:nvSpPr>
+          <p:cNvPr id="6" name="投影片編號版面配置區 5"/>
+          <p:cNvSpPr>
+            <a:spLocks noGrp="1"/>
+          </p:cNvSpPr>
+          <p:nvPr>
+            <p:ph type="sldNum" sz="quarter" idx="12"/>
+          </p:nvPr>
+        </p:nvSpPr>
+        <p:spPr/>
+        <p:txBody>
+          <a:bodyPr/>
+          <a:lstStyle/>
+          <a:p>
+            <a:fld id="{E4D7E63D-91F2-4366-A2C4-1B00C9E2590E}" type="slidenum">
+              <a:rPr lang="zh-TW" altLang="en-US" smtClean="0"/>
+              <a:pPr/>
+              <a:t>27</a:t>
+            </a:fld>
+            <a:endParaRPr lang="zh-TW" altLang="en-US"/>
+          </a:p>
+        </p:txBody>
+      </p:sp>
+      <p:pic>
+        <p:nvPicPr>
+          <p:cNvPr id="7" name="Picture 6">
+            <a:extLst>
+              <a:ext uri="{FF2B5EF4-FFF2-40B4-BE49-F238E27FC236}">
+                <a16:creationId xmlns:a16="http://schemas.microsoft.com/office/drawing/2014/main" id="{1BE488C5-DA27-405E-9F7E-A4EF5DF95762}"/>
+              </a:ext>
+            </a:extLst>
+          </p:cNvPr>
+          <p:cNvPicPr>
+            <a:picLocks noChangeAspect="1"/>
+          </p:cNvPicPr>
+          <p:nvPr/>
+        </p:nvPicPr>
+        <p:blipFill>
+          <a:blip r:embed="rId2"/>
+          <a:stretch>
+            <a:fillRect/>
+          </a:stretch>
+        </p:blipFill>
+        <p:spPr>
+          <a:xfrm>
+            <a:off x="3923928" y="3695964"/>
+            <a:ext cx="1004960" cy="885164"/>
+          </a:xfrm>
+          <a:prstGeom prst="rect">
+            <a:avLst/>
+          </a:prstGeom>
+        </p:spPr>
+      </p:pic>
+    </p:spTree>
+    <p:extLst>
+      <p:ext uri="{BB962C8B-B14F-4D97-AF65-F5344CB8AC3E}">
+        <p14:creationId xmlns:p14="http://schemas.microsoft.com/office/powerpoint/2010/main" val="2038381623"/>
       </p:ext>
     </p:extLst>
   </p:cSld>
@@ -12720,9 +12774,332 @@
         </p:nvSpPr>
         <p:spPr>
           <a:xfrm>
-            <a:off x="0" y="2130425"/>
-            <a:ext cx="9144000" cy="1470025"/>
-          </a:xfrm>
+            <a:off x="0" y="0"/>
+            <a:ext cx="9144000" cy="764704"/>
+          </a:xfrm>
+          <a:gradFill flip="none" rotWithShape="1">
+            <a:gsLst>
+              <a:gs pos="0">
+                <a:srgbClr val="C00000">
+                  <a:shade val="30000"/>
+                  <a:satMod val="115000"/>
+                </a:srgbClr>
+              </a:gs>
+              <a:gs pos="50000">
+                <a:srgbClr val="C00000">
+                  <a:shade val="67500"/>
+                  <a:satMod val="115000"/>
+                </a:srgbClr>
+              </a:gs>
+              <a:gs pos="100000">
+                <a:srgbClr val="C00000">
+                  <a:shade val="100000"/>
+                  <a:satMod val="115000"/>
+                </a:srgbClr>
+              </a:gs>
+            </a:gsLst>
+            <a:path path="circle">
+              <a:fillToRect t="100000" r="100000"/>
+            </a:path>
+            <a:tileRect l="-100000" b="-100000"/>
+          </a:gradFill>
+        </p:spPr>
+        <p:txBody>
+          <a:bodyPr>
+            <a:normAutofit/>
+          </a:bodyPr>
+          <a:lstStyle/>
+          <a:p>
+            <a:pPr algn="l"/>
+            <a:r>
+              <a:rPr lang="en-US" altLang="zh-TW" sz="4400" b="1" dirty="0">
+                <a:solidFill>
+                  <a:srgbClr val="FFFF00"/>
+                </a:solidFill>
+              </a:rPr>
+              <a:t>101.9 Summary</a:t>
+            </a:r>
+            <a:endParaRPr lang="zh-TW" altLang="en-US" b="1" dirty="0">
+              <a:solidFill>
+                <a:srgbClr val="FFFF00"/>
+              </a:solidFill>
+            </a:endParaRPr>
+          </a:p>
+        </p:txBody>
+      </p:sp>
+      <p:sp>
+        <p:nvSpPr>
+          <p:cNvPr id="3" name="副標題 2"/>
+          <p:cNvSpPr>
+            <a:spLocks noGrp="1"/>
+          </p:cNvSpPr>
+          <p:nvPr>
+            <p:ph type="subTitle" idx="1"/>
+          </p:nvPr>
+        </p:nvSpPr>
+        <p:spPr>
+          <a:xfrm>
+            <a:off x="426368" y="1357970"/>
+            <a:ext cx="8291263" cy="3511190"/>
+          </a:xfrm>
+          <a:ln>
+            <a:solidFill>
+              <a:srgbClr val="C00000"/>
+            </a:solidFill>
+          </a:ln>
+        </p:spPr>
+        <p:txBody>
+          <a:bodyPr>
+            <a:noAutofit/>
+          </a:bodyPr>
+          <a:lstStyle/>
+          <a:p>
+            <a:pPr marL="342900" indent="-342900" algn="l">
+              <a:buClr>
+                <a:srgbClr val="0070C0"/>
+              </a:buClr>
+              <a:buSzPct val="80000"/>
+              <a:buFont typeface="Wingdings" pitchFamily="2" charset="2"/>
+              <a:buChar char="u"/>
+            </a:pPr>
+            <a:r>
+              <a:rPr kumimoji="0" lang="en-US" altLang="en-US" sz="1800" b="1" i="0" u="none" strike="noStrike" cap="none" normalizeH="0" baseline="0" dirty="0">
+                <a:ln>
+                  <a:noFill/>
+                </a:ln>
+                <a:solidFill>
+                  <a:schemeClr val="tx1"/>
+                </a:solidFill>
+                <a:effectLst/>
+              </a:rPr>
+              <a:t>Summary</a:t>
+            </a:r>
+            <a:endParaRPr kumimoji="0" lang="en-US" altLang="en-US" sz="1800" b="1" u="none" strike="noStrike" cap="none" normalizeH="0" baseline="0" dirty="0">
+              <a:ln>
+                <a:noFill/>
+              </a:ln>
+              <a:solidFill>
+                <a:schemeClr val="tx1"/>
+              </a:solidFill>
+            </a:endParaRPr>
+          </a:p>
+          <a:p>
+            <a:pPr marL="342900" indent="-342900" algn="l">
+              <a:buClr>
+                <a:srgbClr val="0070C0"/>
+              </a:buClr>
+              <a:buSzPct val="80000"/>
+              <a:buFont typeface="Wingdings" pitchFamily="2" charset="2"/>
+              <a:buChar char="u"/>
+            </a:pPr>
+            <a:r>
+              <a:rPr lang="en-US" sz="1800" b="1" i="0" dirty="0">
+                <a:solidFill>
+                  <a:schemeClr val="tx1"/>
+                </a:solidFill>
+                <a:effectLst/>
+              </a:rPr>
+              <a:t>Score is only 80%? </a:t>
+            </a:r>
+          </a:p>
+          <a:p>
+            <a:pPr marL="342900" indent="-342900" algn="l">
+              <a:buClr>
+                <a:srgbClr val="0070C0"/>
+              </a:buClr>
+              <a:buSzPct val="80000"/>
+              <a:buFont typeface="Wingdings" pitchFamily="2" charset="2"/>
+              <a:buChar char="u"/>
+            </a:pPr>
+            <a:r>
+              <a:rPr lang="en-US" sz="1800" b="1" i="0" dirty="0">
+                <a:solidFill>
+                  <a:schemeClr val="tx1"/>
+                </a:solidFill>
+                <a:effectLst/>
+              </a:rPr>
+              <a:t>Not too bad, we limited to the first 80 words of each review.</a:t>
+            </a:r>
+          </a:p>
+          <a:p>
+            <a:pPr marL="342900" indent="-342900" algn="l">
+              <a:buClr>
+                <a:srgbClr val="0070C0"/>
+              </a:buClr>
+              <a:buSzPct val="80000"/>
+              <a:buFont typeface="Wingdings" pitchFamily="2" charset="2"/>
+              <a:buChar char="u"/>
+            </a:pPr>
+            <a:r>
+              <a:rPr lang="en-US" sz="1800" b="1" i="0" dirty="0">
+                <a:solidFill>
+                  <a:schemeClr val="tx1"/>
+                </a:solidFill>
+                <a:effectLst/>
+              </a:rPr>
+              <a:t>Note:</a:t>
+            </a:r>
+          </a:p>
+          <a:p>
+            <a:pPr marL="342900" indent="-342900" algn="l">
+              <a:buClr>
+                <a:srgbClr val="0070C0"/>
+              </a:buClr>
+              <a:buSzPct val="80000"/>
+              <a:buFont typeface="Wingdings" pitchFamily="2" charset="2"/>
+              <a:buChar char="u"/>
+            </a:pPr>
+            <a:r>
+              <a:rPr lang="en-US" sz="1800" b="1" dirty="0">
+                <a:solidFill>
+                  <a:schemeClr val="tx1"/>
+                </a:solidFill>
+              </a:rPr>
+              <a:t>T</a:t>
+            </a:r>
+            <a:r>
+              <a:rPr lang="en-US" sz="1800" b="1" i="0" dirty="0">
+                <a:solidFill>
+                  <a:schemeClr val="tx1"/>
+                </a:solidFill>
+                <a:effectLst/>
+              </a:rPr>
+              <a:t>he validation accuracy while we were training never really improved after the first epoch. </a:t>
+            </a:r>
+            <a:r>
+              <a:rPr lang="en-US" sz="1800" b="1" dirty="0">
+                <a:solidFill>
+                  <a:schemeClr val="tx1"/>
+                </a:solidFill>
+              </a:rPr>
+              <a:t>The model</a:t>
+            </a:r>
+            <a:r>
+              <a:rPr lang="en-US" sz="1800" b="1" i="0" dirty="0">
+                <a:solidFill>
+                  <a:schemeClr val="tx1"/>
+                </a:solidFill>
+                <a:effectLst/>
+              </a:rPr>
+              <a:t> is overfitting. </a:t>
+            </a:r>
+            <a:r>
+              <a:rPr lang="en-US" sz="1800" b="1" dirty="0">
+                <a:solidFill>
+                  <a:schemeClr val="tx1"/>
+                </a:solidFill>
+              </a:rPr>
+              <a:t>We can do</a:t>
+            </a:r>
+            <a:r>
+              <a:rPr lang="en-US" sz="1800" b="1" i="0" dirty="0">
+                <a:solidFill>
+                  <a:schemeClr val="tx1"/>
+                </a:solidFill>
+                <a:effectLst/>
+              </a:rPr>
+              <a:t> early stop after first epoch.</a:t>
+            </a:r>
+          </a:p>
+          <a:p>
+            <a:pPr marL="342900" indent="-342900" algn="l">
+              <a:buClr>
+                <a:srgbClr val="0070C0"/>
+              </a:buClr>
+              <a:buSzPct val="80000"/>
+              <a:buFont typeface="Wingdings" pitchFamily="2" charset="2"/>
+              <a:buChar char="u"/>
+            </a:pPr>
+            <a:r>
+              <a:rPr lang="en-US" sz="1800" b="1" dirty="0">
+                <a:solidFill>
+                  <a:schemeClr val="tx1"/>
+                </a:solidFill>
+              </a:rPr>
+              <a:t>RNN</a:t>
+            </a:r>
+            <a:r>
+              <a:rPr lang="en-US" sz="1800" b="1" i="0" dirty="0">
+                <a:solidFill>
+                  <a:schemeClr val="tx1"/>
+                </a:solidFill>
+                <a:effectLst/>
+              </a:rPr>
+              <a:t> that can "read" reviews and deduce whether the author liked the movie or not based on that text. </a:t>
+            </a:r>
+          </a:p>
+          <a:p>
+            <a:pPr marL="342900" indent="-342900" algn="l">
+              <a:buClr>
+                <a:srgbClr val="0070C0"/>
+              </a:buClr>
+              <a:buSzPct val="80000"/>
+              <a:buFont typeface="Wingdings" pitchFamily="2" charset="2"/>
+              <a:buChar char="u"/>
+            </a:pPr>
+            <a:r>
+              <a:rPr lang="en-US" sz="1800" b="1" dirty="0">
+                <a:solidFill>
+                  <a:schemeClr val="tx1"/>
+                </a:solidFill>
+              </a:rPr>
+              <a:t>RNN</a:t>
+            </a:r>
+            <a:r>
+              <a:rPr lang="en-US" sz="1800" b="1" i="0" dirty="0">
+                <a:solidFill>
+                  <a:schemeClr val="tx1"/>
+                </a:solidFill>
+                <a:effectLst/>
+              </a:rPr>
+              <a:t> takes the context of each word and its position in the review into account - and setting up the model itself was just a few lines of code.</a:t>
+            </a:r>
+          </a:p>
+          <a:p>
+            <a:pPr marL="342900" indent="-342900" algn="l">
+              <a:buClr>
+                <a:srgbClr val="0070C0"/>
+              </a:buClr>
+              <a:buSzPct val="80000"/>
+              <a:buFont typeface="Wingdings" pitchFamily="2" charset="2"/>
+              <a:buChar char="u"/>
+            </a:pPr>
+            <a:r>
+              <a:rPr lang="en-US" sz="1800" b="1" dirty="0">
+                <a:solidFill>
+                  <a:schemeClr val="tx1"/>
+                </a:solidFill>
+              </a:rPr>
+              <a:t>RNN can be implemented easily</a:t>
+            </a:r>
+            <a:r>
+              <a:rPr lang="en-US" sz="1800" b="1" i="0" dirty="0">
+                <a:solidFill>
+                  <a:schemeClr val="tx1"/>
+                </a:solidFill>
+                <a:effectLst/>
+              </a:rPr>
+              <a:t> with Keras.</a:t>
+            </a:r>
+          </a:p>
+        </p:txBody>
+      </p:sp>
+      <p:sp>
+        <p:nvSpPr>
+          <p:cNvPr id="4" name="標題 1"/>
+          <p:cNvSpPr txBox="1">
+            <a:spLocks/>
+          </p:cNvSpPr>
+          <p:nvPr/>
+        </p:nvSpPr>
+        <p:spPr>
+          <a:xfrm>
+            <a:off x="0" y="764704"/>
+            <a:ext cx="9144000" cy="360040"/>
+          </a:xfrm>
+          <a:prstGeom prst="rect">
+            <a:avLst/>
+          </a:prstGeom>
           <a:gradFill flip="none" rotWithShape="1">
             <a:gsLst>
               <a:gs pos="0">
@@ -12751,6 +13128,357 @@
           </a:gradFill>
         </p:spPr>
         <p:txBody>
+          <a:bodyPr vert="horz" lIns="91440" tIns="45720" rIns="91440" bIns="45720" rtlCol="0" anchor="ctr">
+            <a:normAutofit/>
+          </a:bodyPr>
+          <a:lstStyle/>
+          <a:p>
+            <a:pPr lvl="0">
+              <a:spcBef>
+                <a:spcPct val="0"/>
+              </a:spcBef>
+            </a:pPr>
+            <a:r>
+              <a:rPr lang="en-US" sz="1600" dirty="0"/>
+              <a:t>https://github.com/peterhchen/930_Python_ML_DS_DL</a:t>
+            </a:r>
+            <a:endParaRPr kumimoji="0" lang="zh-TW" altLang="en-US" sz="1600" b="0" i="0" u="none" strike="noStrike" kern="1200" cap="none" spc="0" normalizeH="0" baseline="0" noProof="0" dirty="0">
+              <a:ln>
+                <a:noFill/>
+              </a:ln>
+              <a:solidFill>
+                <a:schemeClr val="tx1"/>
+              </a:solidFill>
+              <a:effectLst/>
+              <a:uLnTx/>
+              <a:uFillTx/>
+              <a:latin typeface="+mj-lt"/>
+              <a:ea typeface="+mj-ea"/>
+              <a:cs typeface="+mj-cs"/>
+            </a:endParaRPr>
+          </a:p>
+        </p:txBody>
+      </p:sp>
+      <p:sp>
+        <p:nvSpPr>
+          <p:cNvPr id="5" name="日期版面配置區 4"/>
+          <p:cNvSpPr>
+            <a:spLocks noGrp="1"/>
+          </p:cNvSpPr>
+          <p:nvPr>
+            <p:ph type="dt" sz="half" idx="10"/>
+          </p:nvPr>
+        </p:nvSpPr>
+        <p:spPr>
+          <a:xfrm>
+            <a:off x="457200" y="6343695"/>
+            <a:ext cx="2133600" cy="365125"/>
+          </a:xfrm>
+        </p:spPr>
+        <p:txBody>
+          <a:bodyPr/>
+          <a:lstStyle/>
+          <a:p>
+            <a:fld id="{A4F910E6-8D00-4BAF-8C48-9688E0B449D3}" type="datetime1">
+              <a:rPr lang="zh-TW" altLang="en-US" smtClean="0"/>
+              <a:pPr/>
+              <a:t>2020/9/21</a:t>
+            </a:fld>
+            <a:endParaRPr lang="zh-TW" altLang="en-US"/>
+          </a:p>
+        </p:txBody>
+      </p:sp>
+      <p:sp>
+        <p:nvSpPr>
+          <p:cNvPr id="6" name="投影片編號版面配置區 5"/>
+          <p:cNvSpPr>
+            <a:spLocks noGrp="1"/>
+          </p:cNvSpPr>
+          <p:nvPr>
+            <p:ph type="sldNum" sz="quarter" idx="12"/>
+          </p:nvPr>
+        </p:nvSpPr>
+        <p:spPr/>
+        <p:txBody>
+          <a:bodyPr/>
+          <a:lstStyle/>
+          <a:p>
+            <a:fld id="{E4D7E63D-91F2-4366-A2C4-1B00C9E2590E}" type="slidenum">
+              <a:rPr lang="zh-TW" altLang="en-US" smtClean="0"/>
+              <a:pPr/>
+              <a:t>28</a:t>
+            </a:fld>
+            <a:endParaRPr lang="zh-TW" altLang="en-US"/>
+          </a:p>
+        </p:txBody>
+      </p:sp>
+      <p:sp>
+        <p:nvSpPr>
+          <p:cNvPr id="16" name="Rectangle 10">
+            <a:hlinkClick r:id="rId2"/>
+            <a:extLst>
+              <a:ext uri="{FF2B5EF4-FFF2-40B4-BE49-F238E27FC236}">
+                <a16:creationId xmlns:a16="http://schemas.microsoft.com/office/drawing/2014/main" id="{62B2A935-4165-4F58-9F94-8EBD01713D35}"/>
+              </a:ext>
+            </a:extLst>
+          </p:cNvPr>
+          <p:cNvSpPr>
+            <a:spLocks noChangeArrowheads="1"/>
+          </p:cNvSpPr>
+          <p:nvPr/>
+        </p:nvSpPr>
+        <p:spPr bwMode="auto">
+          <a:xfrm>
+            <a:off x="152400" y="152400"/>
+            <a:ext cx="3933825" cy="0"/>
+          </a:xfrm>
+          <a:prstGeom prst="rect">
+            <a:avLst/>
+          </a:prstGeom>
+          <a:solidFill>
+            <a:srgbClr val="F9F9F9"/>
+          </a:solidFill>
+          <a:ln>
+            <a:noFill/>
+          </a:ln>
+          <a:effectLst/>
+          <a:extLst>
+            <a:ext uri="{91240B29-F687-4F45-9708-019B960494DF}">
+              <a14:hiddenLine xmlns:a14="http://schemas.microsoft.com/office/drawing/2010/main" w="9525">
+                <a:solidFill>
+                  <a:schemeClr val="tx1"/>
+                </a:solidFill>
+                <a:miter lim="800000"/>
+                <a:headEnd/>
+                <a:tailEnd/>
+              </a14:hiddenLine>
+            </a:ext>
+            <a:ext uri="{AF507438-7753-43E0-B8FC-AC1667EBCBE1}">
+              <a14:hiddenEffects xmlns:a14="http://schemas.microsoft.com/office/drawing/2010/main">
+                <a:effectLst>
+                  <a:outerShdw dist="35921" dir="2700000" algn="ctr" rotWithShape="0">
+                    <a:schemeClr val="bg2"/>
+                  </a:outerShdw>
+                </a:effectLst>
+              </a14:hiddenEffects>
+            </a:ext>
+          </a:extLst>
+        </p:spPr>
+        <p:txBody>
+          <a:bodyPr vert="horz" wrap="square" lIns="91440" tIns="45720" rIns="91440" bIns="45720" numCol="1" anchor="ctr" anchorCtr="0" compatLnSpc="1">
+            <a:prstTxWarp prst="textNoShape">
+              <a:avLst/>
+            </a:prstTxWarp>
+            <a:spAutoFit/>
+          </a:bodyPr>
+          <a:lstStyle/>
+          <a:p>
+            <a:endParaRPr lang="en-US"/>
+          </a:p>
+        </p:txBody>
+      </p:sp>
+      <p:sp>
+        <p:nvSpPr>
+          <p:cNvPr id="17" name="Rectangle 11">
+            <a:extLst>
+              <a:ext uri="{FF2B5EF4-FFF2-40B4-BE49-F238E27FC236}">
+                <a16:creationId xmlns:a16="http://schemas.microsoft.com/office/drawing/2014/main" id="{F1807D9A-DC3A-4776-8ADF-C87633FC6B84}"/>
+              </a:ext>
+            </a:extLst>
+          </p:cNvPr>
+          <p:cNvSpPr>
+            <a:spLocks noChangeArrowheads="1"/>
+          </p:cNvSpPr>
+          <p:nvPr/>
+        </p:nvSpPr>
+        <p:spPr bwMode="auto">
+          <a:xfrm>
+            <a:off x="152400" y="152400"/>
+            <a:ext cx="9144000" cy="0"/>
+          </a:xfrm>
+          <a:prstGeom prst="rect">
+            <a:avLst/>
+          </a:prstGeom>
+          <a:solidFill>
+            <a:srgbClr val="F9F9F9"/>
+          </a:solidFill>
+          <a:ln>
+            <a:noFill/>
+          </a:ln>
+          <a:effectLst/>
+          <a:extLst>
+            <a:ext uri="{91240B29-F687-4F45-9708-019B960494DF}">
+              <a14:hiddenLine xmlns:a14="http://schemas.microsoft.com/office/drawing/2010/main" w="9525">
+                <a:solidFill>
+                  <a:schemeClr val="tx1"/>
+                </a:solidFill>
+                <a:miter lim="800000"/>
+                <a:headEnd/>
+                <a:tailEnd/>
+              </a14:hiddenLine>
+            </a:ext>
+            <a:ext uri="{AF507438-7753-43E0-B8FC-AC1667EBCBE1}">
+              <a14:hiddenEffects xmlns:a14="http://schemas.microsoft.com/office/drawing/2010/main">
+                <a:effectLst>
+                  <a:outerShdw dist="35921" dir="2700000" algn="ctr" rotWithShape="0">
+                    <a:schemeClr val="bg2"/>
+                  </a:outerShdw>
+                </a:effectLst>
+              </a14:hiddenEffects>
+            </a:ext>
+          </a:extLst>
+        </p:spPr>
+        <p:txBody>
+          <a:bodyPr vert="horz" wrap="square" lIns="91440" tIns="45720" rIns="91440" bIns="45720" numCol="1" anchor="ctr" anchorCtr="0" compatLnSpc="1">
+            <a:prstTxWarp prst="textNoShape">
+              <a:avLst/>
+            </a:prstTxWarp>
+            <a:spAutoFit/>
+          </a:bodyPr>
+          <a:lstStyle/>
+          <a:p>
+            <a:endParaRPr lang="en-US"/>
+          </a:p>
+        </p:txBody>
+      </p:sp>
+      <p:sp>
+        <p:nvSpPr>
+          <p:cNvPr id="19" name="Rectangle 13">
+            <a:hlinkClick r:id="rId3" tooltip="Next (SHIFT+n)"/>
+            <a:extLst>
+              <a:ext uri="{FF2B5EF4-FFF2-40B4-BE49-F238E27FC236}">
+                <a16:creationId xmlns:a16="http://schemas.microsoft.com/office/drawing/2014/main" id="{E441ABD1-4629-43A1-A350-4BDCD5209807}"/>
+              </a:ext>
+            </a:extLst>
+          </p:cNvPr>
+          <p:cNvSpPr>
+            <a:spLocks noChangeArrowheads="1"/>
+          </p:cNvSpPr>
+          <p:nvPr/>
+        </p:nvSpPr>
+        <p:spPr bwMode="auto">
+          <a:xfrm>
+            <a:off x="152400" y="152400"/>
+            <a:ext cx="3819525" cy="0"/>
+          </a:xfrm>
+          <a:prstGeom prst="rect">
+            <a:avLst/>
+          </a:prstGeom>
+          <a:solidFill>
+            <a:srgbClr val="F9F9F9"/>
+          </a:solidFill>
+          <a:ln>
+            <a:noFill/>
+          </a:ln>
+          <a:effectLst/>
+          <a:extLst>
+            <a:ext uri="{91240B29-F687-4F45-9708-019B960494DF}">
+              <a14:hiddenLine xmlns:a14="http://schemas.microsoft.com/office/drawing/2010/main" w="9525">
+                <a:solidFill>
+                  <a:schemeClr val="tx1"/>
+                </a:solidFill>
+                <a:miter lim="800000"/>
+                <a:headEnd/>
+                <a:tailEnd/>
+              </a14:hiddenLine>
+            </a:ext>
+            <a:ext uri="{AF507438-7753-43E0-B8FC-AC1667EBCBE1}">
+              <a14:hiddenEffects xmlns:a14="http://schemas.microsoft.com/office/drawing/2010/main">
+                <a:effectLst>
+                  <a:outerShdw dist="35921" dir="2700000" algn="ctr" rotWithShape="0">
+                    <a:schemeClr val="bg2"/>
+                  </a:outerShdw>
+                </a:effectLst>
+              </a14:hiddenEffects>
+            </a:ext>
+          </a:extLst>
+        </p:spPr>
+        <p:txBody>
+          <a:bodyPr vert="horz" wrap="square" lIns="91440" tIns="45720" rIns="91440" bIns="45720" numCol="1" anchor="ctr" anchorCtr="0" compatLnSpc="1">
+            <a:prstTxWarp prst="textNoShape">
+              <a:avLst/>
+            </a:prstTxWarp>
+            <a:spAutoFit/>
+          </a:bodyPr>
+          <a:lstStyle/>
+          <a:p>
+            <a:endParaRPr lang="en-US"/>
+          </a:p>
+        </p:txBody>
+      </p:sp>
+    </p:spTree>
+    <p:extLst>
+      <p:ext uri="{BB962C8B-B14F-4D97-AF65-F5344CB8AC3E}">
+        <p14:creationId xmlns:p14="http://schemas.microsoft.com/office/powerpoint/2010/main" val="2090967265"/>
+      </p:ext>
+    </p:extLst>
+  </p:cSld>
+  <p:clrMapOvr>
+    <a:masterClrMapping/>
+  </p:clrMapOvr>
+</p:sld>
+</file>
+
+<file path=ppt/slides/slide29.xml><?xml version="1.0" encoding="utf-8"?>
+<p:sld xmlns:a="http://schemas.openxmlformats.org/drawingml/2006/main" xmlns:r="http://schemas.openxmlformats.org/officeDocument/2006/relationships" xmlns:p="http://schemas.openxmlformats.org/presentationml/2006/main">
+  <p:cSld>
+    <p:spTree>
+      <p:nvGrpSpPr>
+        <p:cNvPr id="1" name=""/>
+        <p:cNvGrpSpPr/>
+        <p:nvPr/>
+      </p:nvGrpSpPr>
+      <p:grpSpPr>
+        <a:xfrm>
+          <a:off x="0" y="0"/>
+          <a:ext cx="0" cy="0"/>
+          <a:chOff x="0" y="0"/>
+          <a:chExt cx="0" cy="0"/>
+        </a:xfrm>
+      </p:grpSpPr>
+      <p:sp>
+        <p:nvSpPr>
+          <p:cNvPr id="2" name="標題 1"/>
+          <p:cNvSpPr>
+            <a:spLocks noGrp="1"/>
+          </p:cNvSpPr>
+          <p:nvPr>
+            <p:ph type="ctrTitle"/>
+          </p:nvPr>
+        </p:nvSpPr>
+        <p:spPr>
+          <a:xfrm>
+            <a:off x="0" y="2130425"/>
+            <a:ext cx="9144000" cy="1470025"/>
+          </a:xfrm>
+          <a:gradFill flip="none" rotWithShape="1">
+            <a:gsLst>
+              <a:gs pos="0">
+                <a:srgbClr val="00B0F0">
+                  <a:shade val="30000"/>
+                  <a:satMod val="115000"/>
+                </a:srgbClr>
+              </a:gs>
+              <a:gs pos="50000">
+                <a:srgbClr val="00B0F0">
+                  <a:shade val="67500"/>
+                  <a:satMod val="115000"/>
+                </a:srgbClr>
+              </a:gs>
+              <a:gs pos="100000">
+                <a:srgbClr val="00B0F0">
+                  <a:shade val="100000"/>
+                  <a:satMod val="115000"/>
+                </a:srgbClr>
+              </a:gs>
+            </a:gsLst>
+            <a:path path="circle">
+              <a:fillToRect t="100000" r="100000"/>
+            </a:path>
+            <a:tileRect l="-100000" b="-100000"/>
+          </a:gradFill>
+        </p:spPr>
+        <p:txBody>
           <a:bodyPr>
             <a:normAutofit/>
           </a:bodyPr>
@@ -12814,7 +13542,7 @@
             <a:fld id="{E4D7E63D-91F2-4366-A2C4-1B00C9E2590E}" type="slidenum">
               <a:rPr lang="zh-TW" altLang="en-US" smtClean="0"/>
               <a:pPr/>
-              <a:t>28</a:t>
+              <a:t>29</a:t>
             </a:fld>
             <a:endParaRPr lang="zh-TW" altLang="en-US"/>
           </a:p>

</xml_diff>